<commit_message>
resources for 3rd lesson
</commit_message>
<xml_diff>
--- a/Slides/Lesson3.pptx
+++ b/Slides/Lesson3.pptx
@@ -22,13 +22,6 @@
     <p:sldId id="269" r:id="rId16"/>
     <p:sldId id="281" r:id="rId17"/>
     <p:sldId id="272" r:id="rId18"/>
-    <p:sldId id="276" r:id="rId19"/>
-    <p:sldId id="277" r:id="rId20"/>
-    <p:sldId id="278" r:id="rId21"/>
-    <p:sldId id="279" r:id="rId22"/>
-    <p:sldId id="280" r:id="rId23"/>
-    <p:sldId id="270" r:id="rId24"/>
-    <p:sldId id="273" r:id="rId25"/>
   </p:sldIdLst>
   <p:sldSz cx="9144000" cy="6858000" type="screen4x3"/>
   <p:notesSz cx="6858000" cy="9144000"/>
@@ -327,7 +320,7 @@
           <a:p>
             <a:fld id="{1F14DB6E-5E5A-D64F-BC9B-82536EC5F491}" type="datetimeFigureOut">
               <a:rPr lang="en-US" smtClean="0"/>
-              <a:t>1/30/16</a:t>
+              <a:t>2/1/16</a:t>
             </a:fld>
             <a:endParaRPr lang="en-US"/>
           </a:p>
@@ -497,7 +490,7 @@
           <a:p>
             <a:fld id="{1F14DB6E-5E5A-D64F-BC9B-82536EC5F491}" type="datetimeFigureOut">
               <a:rPr lang="en-US" smtClean="0"/>
-              <a:t>1/30/16</a:t>
+              <a:t>2/1/16</a:t>
             </a:fld>
             <a:endParaRPr lang="en-US"/>
           </a:p>
@@ -677,7 +670,7 @@
           <a:p>
             <a:fld id="{1F14DB6E-5E5A-D64F-BC9B-82536EC5F491}" type="datetimeFigureOut">
               <a:rPr lang="en-US" smtClean="0"/>
-              <a:t>1/30/16</a:t>
+              <a:t>2/1/16</a:t>
             </a:fld>
             <a:endParaRPr lang="en-US"/>
           </a:p>
@@ -847,7 +840,7 @@
           <a:p>
             <a:fld id="{1F14DB6E-5E5A-D64F-BC9B-82536EC5F491}" type="datetimeFigureOut">
               <a:rPr lang="en-US" smtClean="0"/>
-              <a:t>1/30/16</a:t>
+              <a:t>2/1/16</a:t>
             </a:fld>
             <a:endParaRPr lang="en-US"/>
           </a:p>
@@ -1093,7 +1086,7 @@
           <a:p>
             <a:fld id="{1F14DB6E-5E5A-D64F-BC9B-82536EC5F491}" type="datetimeFigureOut">
               <a:rPr lang="en-US" smtClean="0"/>
-              <a:t>1/30/16</a:t>
+              <a:t>2/1/16</a:t>
             </a:fld>
             <a:endParaRPr lang="en-US"/>
           </a:p>
@@ -1381,7 +1374,7 @@
           <a:p>
             <a:fld id="{1F14DB6E-5E5A-D64F-BC9B-82536EC5F491}" type="datetimeFigureOut">
               <a:rPr lang="en-US" smtClean="0"/>
-              <a:t>1/30/16</a:t>
+              <a:t>2/1/16</a:t>
             </a:fld>
             <a:endParaRPr lang="en-US"/>
           </a:p>
@@ -1803,7 +1796,7 @@
           <a:p>
             <a:fld id="{1F14DB6E-5E5A-D64F-BC9B-82536EC5F491}" type="datetimeFigureOut">
               <a:rPr lang="en-US" smtClean="0"/>
-              <a:t>1/30/16</a:t>
+              <a:t>2/1/16</a:t>
             </a:fld>
             <a:endParaRPr lang="en-US"/>
           </a:p>
@@ -1921,7 +1914,7 @@
           <a:p>
             <a:fld id="{1F14DB6E-5E5A-D64F-BC9B-82536EC5F491}" type="datetimeFigureOut">
               <a:rPr lang="en-US" smtClean="0"/>
-              <a:t>1/30/16</a:t>
+              <a:t>2/1/16</a:t>
             </a:fld>
             <a:endParaRPr lang="en-US"/>
           </a:p>
@@ -2016,7 +2009,7 @@
           <a:p>
             <a:fld id="{1F14DB6E-5E5A-D64F-BC9B-82536EC5F491}" type="datetimeFigureOut">
               <a:rPr lang="en-US" smtClean="0"/>
-              <a:t>1/30/16</a:t>
+              <a:t>2/1/16</a:t>
             </a:fld>
             <a:endParaRPr lang="en-US"/>
           </a:p>
@@ -2293,7 +2286,7 @@
           <a:p>
             <a:fld id="{1F14DB6E-5E5A-D64F-BC9B-82536EC5F491}" type="datetimeFigureOut">
               <a:rPr lang="en-US" smtClean="0"/>
-              <a:t>1/30/16</a:t>
+              <a:t>2/1/16</a:t>
             </a:fld>
             <a:endParaRPr lang="en-US"/>
           </a:p>
@@ -2546,7 +2539,7 @@
           <a:p>
             <a:fld id="{1F14DB6E-5E5A-D64F-BC9B-82536EC5F491}" type="datetimeFigureOut">
               <a:rPr lang="en-US" smtClean="0"/>
-              <a:t>1/30/16</a:t>
+              <a:t>2/1/16</a:t>
             </a:fld>
             <a:endParaRPr lang="en-US"/>
           </a:p>
@@ -2759,7 +2752,7 @@
           <a:p>
             <a:fld id="{1F14DB6E-5E5A-D64F-BC9B-82536EC5F491}" type="datetimeFigureOut">
               <a:rPr lang="en-US" smtClean="0"/>
-              <a:t>1/30/16</a:t>
+              <a:t>2/1/16</a:t>
             </a:fld>
             <a:endParaRPr lang="en-US"/>
           </a:p>
@@ -3702,11 +3695,7 @@
           <a:p>
             <a:r>
               <a:rPr lang="en-US" dirty="0" smtClean="0"/>
-              <a:t>The </a:t>
-            </a:r>
-            <a:r>
-              <a:rPr lang="en-US" dirty="0" smtClean="0"/>
-              <a:t>index always starts at 0</a:t>
+              <a:t>The index always starts at 0</a:t>
             </a:r>
           </a:p>
           <a:p>
@@ -3714,17 +3703,12 @@
               <a:rPr lang="en-US" dirty="0" smtClean="0"/>
               <a:t>DEMO: </a:t>
             </a:r>
-            <a:endParaRPr lang="en-US" dirty="0" smtClean="0"/>
           </a:p>
           <a:p>
             <a:pPr lvl="1"/>
             <a:r>
               <a:rPr lang="en-US" dirty="0" smtClean="0"/>
-              <a:t>max, min grades </a:t>
-            </a:r>
-            <a:r>
-              <a:rPr lang="en-US" dirty="0" smtClean="0"/>
-              <a:t>program. </a:t>
+              <a:t>max, min grades program. </a:t>
             </a:r>
             <a:endParaRPr lang="en-US" dirty="0"/>
           </a:p>
@@ -3850,13 +3834,8 @@
           <a:p>
             <a:r>
               <a:rPr lang="en-US" dirty="0" smtClean="0"/>
-              <a:t>Length doesn’t take into account the null terminating character (‘\0</a:t>
-            </a:r>
-            <a:r>
-              <a:rPr lang="en-US" dirty="0" smtClean="0"/>
-              <a:t>’)</a:t>
-            </a:r>
-            <a:endParaRPr lang="en-US" dirty="0" smtClean="0"/>
+              <a:t>Length doesn’t take into account the null terminating character (‘\0’)</a:t>
+            </a:r>
           </a:p>
         </p:txBody>
       </p:sp>
@@ -3912,7 +3891,7 @@
           <a:bodyPr/>
           <a:lstStyle/>
           <a:p>
-            <a:endParaRPr lang="en-US"/>
+            <a:endParaRPr lang="en-US" dirty="0"/>
           </a:p>
         </p:txBody>
       </p:sp>
@@ -4129,699 +4108,6 @@
 </p:sld>
 </file>
 
-<file path=ppt/slides/slide18.xml><?xml version="1.0" encoding="utf-8"?>
-<p:sld xmlns:a="http://schemas.openxmlformats.org/drawingml/2006/main" xmlns:r="http://schemas.openxmlformats.org/officeDocument/2006/relationships" xmlns:p="http://schemas.openxmlformats.org/presentationml/2006/main">
-  <p:cSld>
-    <p:spTree>
-      <p:nvGrpSpPr>
-        <p:cNvPr id="1" name=""/>
-        <p:cNvGrpSpPr/>
-        <p:nvPr/>
-      </p:nvGrpSpPr>
-      <p:grpSpPr>
-        <a:xfrm>
-          <a:off x="0" y="0"/>
-          <a:ext cx="0" cy="0"/>
-          <a:chOff x="0" y="0"/>
-          <a:chExt cx="0" cy="0"/>
-        </a:xfrm>
-      </p:grpSpPr>
-      <p:sp>
-        <p:nvSpPr>
-          <p:cNvPr id="2" name="Title 1"/>
-          <p:cNvSpPr>
-            <a:spLocks noGrp="1"/>
-          </p:cNvSpPr>
-          <p:nvPr>
-            <p:ph type="title"/>
-          </p:nvPr>
-        </p:nvSpPr>
-        <p:spPr/>
-        <p:txBody>
-          <a:bodyPr/>
-          <a:lstStyle/>
-          <a:p>
-            <a:r>
-              <a:rPr lang="en-US" dirty="0" smtClean="0"/>
-              <a:t>Operating System Considerations</a:t>
-            </a:r>
-            <a:endParaRPr lang="en-US" dirty="0"/>
-          </a:p>
-        </p:txBody>
-      </p:sp>
-      <p:sp>
-        <p:nvSpPr>
-          <p:cNvPr id="3" name="Content Placeholder 2"/>
-          <p:cNvSpPr>
-            <a:spLocks noGrp="1"/>
-          </p:cNvSpPr>
-          <p:nvPr>
-            <p:ph idx="1"/>
-          </p:nvPr>
-        </p:nvSpPr>
-        <p:spPr/>
-        <p:txBody>
-          <a:bodyPr/>
-          <a:lstStyle/>
-          <a:p>
-            <a:r>
-              <a:rPr lang="en-US" dirty="0" smtClean="0"/>
-              <a:t>Steps to running a program:</a:t>
-            </a:r>
-          </a:p>
-          <a:p>
-            <a:pPr lvl="1"/>
-            <a:r>
-              <a:rPr lang="en-US" dirty="0" smtClean="0"/>
-              <a:t>Edit (</a:t>
-            </a:r>
-            <a:r>
-              <a:rPr lang="en-US" b="1" dirty="0" smtClean="0"/>
-              <a:t>Sublime, </a:t>
-            </a:r>
-            <a:r>
-              <a:rPr lang="en-US" b="1" dirty="0" err="1" smtClean="0"/>
-              <a:t>Emacs</a:t>
-            </a:r>
-            <a:r>
-              <a:rPr lang="en-US" b="1" dirty="0" smtClean="0"/>
-              <a:t>, vi</a:t>
-            </a:r>
-            <a:r>
-              <a:rPr lang="en-US" dirty="0" smtClean="0"/>
-              <a:t>)</a:t>
-            </a:r>
-          </a:p>
-          <a:p>
-            <a:pPr lvl="1"/>
-            <a:r>
-              <a:rPr lang="en-US" dirty="0" smtClean="0"/>
-              <a:t>Compile  (</a:t>
-            </a:r>
-            <a:r>
-              <a:rPr lang="en-US" b="1" dirty="0" smtClean="0"/>
-              <a:t>cc </a:t>
-            </a:r>
-            <a:r>
-              <a:rPr lang="en-US" b="1" dirty="0" err="1" smtClean="0"/>
-              <a:t>program.c</a:t>
-            </a:r>
-            <a:r>
-              <a:rPr lang="en-US" dirty="0" smtClean="0"/>
-              <a:t>)</a:t>
-            </a:r>
-          </a:p>
-          <a:p>
-            <a:pPr lvl="1"/>
-            <a:r>
-              <a:rPr lang="en-US" dirty="0" smtClean="0"/>
-              <a:t>Execute (</a:t>
-            </a:r>
-            <a:r>
-              <a:rPr lang="en-US" b="1" dirty="0" smtClean="0"/>
-              <a:t>./</a:t>
-            </a:r>
-            <a:r>
-              <a:rPr lang="en-US" b="1" dirty="0" err="1" smtClean="0"/>
-              <a:t>a.out</a:t>
-            </a:r>
-            <a:r>
-              <a:rPr lang="en-US" dirty="0" smtClean="0"/>
-              <a:t> or </a:t>
-            </a:r>
-            <a:r>
-              <a:rPr lang="en-US" b="1" dirty="0" smtClean="0"/>
-              <a:t>./</a:t>
-            </a:r>
-            <a:r>
-              <a:rPr lang="en-US" b="1" dirty="0" err="1" smtClean="0"/>
-              <a:t>a.exe</a:t>
-            </a:r>
-            <a:r>
-              <a:rPr lang="en-US" dirty="0" smtClean="0"/>
-              <a:t>)</a:t>
-            </a:r>
-            <a:endParaRPr lang="en-US" dirty="0"/>
-          </a:p>
-        </p:txBody>
-      </p:sp>
-    </p:spTree>
-    <p:extLst>
-      <p:ext uri="{BB962C8B-B14F-4D97-AF65-F5344CB8AC3E}">
-        <p14:creationId xmlns:p14="http://schemas.microsoft.com/office/powerpoint/2010/main" val="929809463"/>
-      </p:ext>
-    </p:extLst>
-  </p:cSld>
-  <p:clrMapOvr>
-    <a:masterClrMapping/>
-  </p:clrMapOvr>
-  <p:timing>
-    <p:tnLst>
-      <p:par>
-        <p:cTn id="1" dur="indefinite" restart="never" nodeType="tmRoot">
-          <p:childTnLst>
-            <p:seq concurrent="1" nextAc="seek">
-              <p:cTn id="2" dur="indefinite" nodeType="mainSeq">
-                <p:childTnLst>
-                  <p:par>
-                    <p:cTn id="3" fill="hold">
-                      <p:stCondLst>
-                        <p:cond delay="indefinite"/>
-                      </p:stCondLst>
-                      <p:childTnLst>
-                        <p:par>
-                          <p:cTn id="4" fill="hold">
-                            <p:stCondLst>
-                              <p:cond delay="0"/>
-                            </p:stCondLst>
-                            <p:childTnLst>
-                              <p:par>
-                                <p:cTn id="5" presetID="2" presetClass="entr" presetSubtype="4" fill="hold" nodeType="clickEffect">
-                                  <p:stCondLst>
-                                    <p:cond delay="0"/>
-                                  </p:stCondLst>
-                                  <p:childTnLst>
-                                    <p:set>
-                                      <p:cBhvr>
-                                        <p:cTn id="6" dur="1" fill="hold">
-                                          <p:stCondLst>
-                                            <p:cond delay="0"/>
-                                          </p:stCondLst>
-                                        </p:cTn>
-                                        <p:tgtEl>
-                                          <p:spTgt spid="3">
-                                            <p:txEl>
-                                              <p:pRg st="1" end="1"/>
-                                            </p:txEl>
-                                          </p:spTgt>
-                                        </p:tgtEl>
-                                        <p:attrNameLst>
-                                          <p:attrName>style.visibility</p:attrName>
-                                        </p:attrNameLst>
-                                      </p:cBhvr>
-                                      <p:to>
-                                        <p:strVal val="visible"/>
-                                      </p:to>
-                                    </p:set>
-                                    <p:anim calcmode="lin" valueType="num">
-                                      <p:cBhvr additive="base">
-                                        <p:cTn id="7" dur="500" fill="hold"/>
-                                        <p:tgtEl>
-                                          <p:spTgt spid="3">
-                                            <p:txEl>
-                                              <p:pRg st="1" end="1"/>
-                                            </p:txEl>
-                                          </p:spTgt>
-                                        </p:tgtEl>
-                                        <p:attrNameLst>
-                                          <p:attrName>ppt_x</p:attrName>
-                                        </p:attrNameLst>
-                                      </p:cBhvr>
-                                      <p:tavLst>
-                                        <p:tav tm="0">
-                                          <p:val>
-                                            <p:strVal val="#ppt_x"/>
-                                          </p:val>
-                                        </p:tav>
-                                        <p:tav tm="100000">
-                                          <p:val>
-                                            <p:strVal val="#ppt_x"/>
-                                          </p:val>
-                                        </p:tav>
-                                      </p:tavLst>
-                                    </p:anim>
-                                    <p:anim calcmode="lin" valueType="num">
-                                      <p:cBhvr additive="base">
-                                        <p:cTn id="8" dur="500" fill="hold"/>
-                                        <p:tgtEl>
-                                          <p:spTgt spid="3">
-                                            <p:txEl>
-                                              <p:pRg st="1" end="1"/>
-                                            </p:txEl>
-                                          </p:spTgt>
-                                        </p:tgtEl>
-                                        <p:attrNameLst>
-                                          <p:attrName>ppt_y</p:attrName>
-                                        </p:attrNameLst>
-                                      </p:cBhvr>
-                                      <p:tavLst>
-                                        <p:tav tm="0">
-                                          <p:val>
-                                            <p:strVal val="1+#ppt_h/2"/>
-                                          </p:val>
-                                        </p:tav>
-                                        <p:tav tm="100000">
-                                          <p:val>
-                                            <p:strVal val="#ppt_y"/>
-                                          </p:val>
-                                        </p:tav>
-                                      </p:tavLst>
-                                    </p:anim>
-                                  </p:childTnLst>
-                                </p:cTn>
-                              </p:par>
-                            </p:childTnLst>
-                          </p:cTn>
-                        </p:par>
-                      </p:childTnLst>
-                    </p:cTn>
-                  </p:par>
-                  <p:par>
-                    <p:cTn id="9" fill="hold">
-                      <p:stCondLst>
-                        <p:cond delay="indefinite"/>
-                      </p:stCondLst>
-                      <p:childTnLst>
-                        <p:par>
-                          <p:cTn id="10" fill="hold">
-                            <p:stCondLst>
-                              <p:cond delay="0"/>
-                            </p:stCondLst>
-                            <p:childTnLst>
-                              <p:par>
-                                <p:cTn id="11" presetID="2" presetClass="entr" presetSubtype="4" fill="hold" nodeType="clickEffect">
-                                  <p:stCondLst>
-                                    <p:cond delay="0"/>
-                                  </p:stCondLst>
-                                  <p:childTnLst>
-                                    <p:set>
-                                      <p:cBhvr>
-                                        <p:cTn id="12" dur="1" fill="hold">
-                                          <p:stCondLst>
-                                            <p:cond delay="0"/>
-                                          </p:stCondLst>
-                                        </p:cTn>
-                                        <p:tgtEl>
-                                          <p:spTgt spid="3">
-                                            <p:txEl>
-                                              <p:pRg st="2" end="2"/>
-                                            </p:txEl>
-                                          </p:spTgt>
-                                        </p:tgtEl>
-                                        <p:attrNameLst>
-                                          <p:attrName>style.visibility</p:attrName>
-                                        </p:attrNameLst>
-                                      </p:cBhvr>
-                                      <p:to>
-                                        <p:strVal val="visible"/>
-                                      </p:to>
-                                    </p:set>
-                                    <p:anim calcmode="lin" valueType="num">
-                                      <p:cBhvr additive="base">
-                                        <p:cTn id="13" dur="500" fill="hold"/>
-                                        <p:tgtEl>
-                                          <p:spTgt spid="3">
-                                            <p:txEl>
-                                              <p:pRg st="2" end="2"/>
-                                            </p:txEl>
-                                          </p:spTgt>
-                                        </p:tgtEl>
-                                        <p:attrNameLst>
-                                          <p:attrName>ppt_x</p:attrName>
-                                        </p:attrNameLst>
-                                      </p:cBhvr>
-                                      <p:tavLst>
-                                        <p:tav tm="0">
-                                          <p:val>
-                                            <p:strVal val="#ppt_x"/>
-                                          </p:val>
-                                        </p:tav>
-                                        <p:tav tm="100000">
-                                          <p:val>
-                                            <p:strVal val="#ppt_x"/>
-                                          </p:val>
-                                        </p:tav>
-                                      </p:tavLst>
-                                    </p:anim>
-                                    <p:anim calcmode="lin" valueType="num">
-                                      <p:cBhvr additive="base">
-                                        <p:cTn id="14" dur="500" fill="hold"/>
-                                        <p:tgtEl>
-                                          <p:spTgt spid="3">
-                                            <p:txEl>
-                                              <p:pRg st="2" end="2"/>
-                                            </p:txEl>
-                                          </p:spTgt>
-                                        </p:tgtEl>
-                                        <p:attrNameLst>
-                                          <p:attrName>ppt_y</p:attrName>
-                                        </p:attrNameLst>
-                                      </p:cBhvr>
-                                      <p:tavLst>
-                                        <p:tav tm="0">
-                                          <p:val>
-                                            <p:strVal val="1+#ppt_h/2"/>
-                                          </p:val>
-                                        </p:tav>
-                                        <p:tav tm="100000">
-                                          <p:val>
-                                            <p:strVal val="#ppt_y"/>
-                                          </p:val>
-                                        </p:tav>
-                                      </p:tavLst>
-                                    </p:anim>
-                                  </p:childTnLst>
-                                </p:cTn>
-                              </p:par>
-                            </p:childTnLst>
-                          </p:cTn>
-                        </p:par>
-                      </p:childTnLst>
-                    </p:cTn>
-                  </p:par>
-                  <p:par>
-                    <p:cTn id="15" fill="hold">
-                      <p:stCondLst>
-                        <p:cond delay="indefinite"/>
-                      </p:stCondLst>
-                      <p:childTnLst>
-                        <p:par>
-                          <p:cTn id="16" fill="hold">
-                            <p:stCondLst>
-                              <p:cond delay="0"/>
-                            </p:stCondLst>
-                            <p:childTnLst>
-                              <p:par>
-                                <p:cTn id="17" presetID="2" presetClass="entr" presetSubtype="4" fill="hold" nodeType="clickEffect">
-                                  <p:stCondLst>
-                                    <p:cond delay="0"/>
-                                  </p:stCondLst>
-                                  <p:childTnLst>
-                                    <p:set>
-                                      <p:cBhvr>
-                                        <p:cTn id="18" dur="1" fill="hold">
-                                          <p:stCondLst>
-                                            <p:cond delay="0"/>
-                                          </p:stCondLst>
-                                        </p:cTn>
-                                        <p:tgtEl>
-                                          <p:spTgt spid="3">
-                                            <p:txEl>
-                                              <p:pRg st="3" end="3"/>
-                                            </p:txEl>
-                                          </p:spTgt>
-                                        </p:tgtEl>
-                                        <p:attrNameLst>
-                                          <p:attrName>style.visibility</p:attrName>
-                                        </p:attrNameLst>
-                                      </p:cBhvr>
-                                      <p:to>
-                                        <p:strVal val="visible"/>
-                                      </p:to>
-                                    </p:set>
-                                    <p:anim calcmode="lin" valueType="num">
-                                      <p:cBhvr additive="base">
-                                        <p:cTn id="19" dur="500" fill="hold"/>
-                                        <p:tgtEl>
-                                          <p:spTgt spid="3">
-                                            <p:txEl>
-                                              <p:pRg st="3" end="3"/>
-                                            </p:txEl>
-                                          </p:spTgt>
-                                        </p:tgtEl>
-                                        <p:attrNameLst>
-                                          <p:attrName>ppt_x</p:attrName>
-                                        </p:attrNameLst>
-                                      </p:cBhvr>
-                                      <p:tavLst>
-                                        <p:tav tm="0">
-                                          <p:val>
-                                            <p:strVal val="#ppt_x"/>
-                                          </p:val>
-                                        </p:tav>
-                                        <p:tav tm="100000">
-                                          <p:val>
-                                            <p:strVal val="#ppt_x"/>
-                                          </p:val>
-                                        </p:tav>
-                                      </p:tavLst>
-                                    </p:anim>
-                                    <p:anim calcmode="lin" valueType="num">
-                                      <p:cBhvr additive="base">
-                                        <p:cTn id="20" dur="500" fill="hold"/>
-                                        <p:tgtEl>
-                                          <p:spTgt spid="3">
-                                            <p:txEl>
-                                              <p:pRg st="3" end="3"/>
-                                            </p:txEl>
-                                          </p:spTgt>
-                                        </p:tgtEl>
-                                        <p:attrNameLst>
-                                          <p:attrName>ppt_y</p:attrName>
-                                        </p:attrNameLst>
-                                      </p:cBhvr>
-                                      <p:tavLst>
-                                        <p:tav tm="0">
-                                          <p:val>
-                                            <p:strVal val="1+#ppt_h/2"/>
-                                          </p:val>
-                                        </p:tav>
-                                        <p:tav tm="100000">
-                                          <p:val>
-                                            <p:strVal val="#ppt_y"/>
-                                          </p:val>
-                                        </p:tav>
-                                      </p:tavLst>
-                                    </p:anim>
-                                  </p:childTnLst>
-                                </p:cTn>
-                              </p:par>
-                            </p:childTnLst>
-                          </p:cTn>
-                        </p:par>
-                      </p:childTnLst>
-                    </p:cTn>
-                  </p:par>
-                </p:childTnLst>
-              </p:cTn>
-              <p:prevCondLst>
-                <p:cond evt="onPrev" delay="0">
-                  <p:tgtEl>
-                    <p:sldTgt/>
-                  </p:tgtEl>
-                </p:cond>
-              </p:prevCondLst>
-              <p:nextCondLst>
-                <p:cond evt="onNext" delay="0">
-                  <p:tgtEl>
-                    <p:sldTgt/>
-                  </p:tgtEl>
-                </p:cond>
-              </p:nextCondLst>
-            </p:seq>
-          </p:childTnLst>
-        </p:cTn>
-      </p:par>
-    </p:tnLst>
-  </p:timing>
-</p:sld>
-</file>
-
-<file path=ppt/slides/slide19.xml><?xml version="1.0" encoding="utf-8"?>
-<p:sld xmlns:a="http://schemas.openxmlformats.org/drawingml/2006/main" xmlns:r="http://schemas.openxmlformats.org/officeDocument/2006/relationships" xmlns:p="http://schemas.openxmlformats.org/presentationml/2006/main">
-  <p:cSld>
-    <p:spTree>
-      <p:nvGrpSpPr>
-        <p:cNvPr id="1" name=""/>
-        <p:cNvGrpSpPr/>
-        <p:nvPr/>
-      </p:nvGrpSpPr>
-      <p:grpSpPr>
-        <a:xfrm>
-          <a:off x="0" y="0"/>
-          <a:ext cx="0" cy="0"/>
-          <a:chOff x="0" y="0"/>
-          <a:chExt cx="0" cy="0"/>
-        </a:xfrm>
-      </p:grpSpPr>
-      <p:sp>
-        <p:nvSpPr>
-          <p:cNvPr id="2" name="Title 1"/>
-          <p:cNvSpPr>
-            <a:spLocks noGrp="1"/>
-          </p:cNvSpPr>
-          <p:nvPr>
-            <p:ph type="title"/>
-          </p:nvPr>
-        </p:nvSpPr>
-        <p:spPr/>
-        <p:txBody>
-          <a:bodyPr/>
-          <a:lstStyle/>
-          <a:p>
-            <a:r>
-              <a:rPr lang="en-US" dirty="0" smtClean="0"/>
-              <a:t>Compiler switches</a:t>
-            </a:r>
-            <a:endParaRPr lang="en-US" dirty="0"/>
-          </a:p>
-        </p:txBody>
-      </p:sp>
-      <p:sp>
-        <p:nvSpPr>
-          <p:cNvPr id="3" name="Content Placeholder 2"/>
-          <p:cNvSpPr>
-            <a:spLocks noGrp="1"/>
-          </p:cNvSpPr>
-          <p:nvPr>
-            <p:ph idx="1"/>
-          </p:nvPr>
-        </p:nvSpPr>
-        <p:spPr/>
-        <p:txBody>
-          <a:bodyPr/>
-          <a:lstStyle/>
-          <a:p>
-            <a:r>
-              <a:rPr lang="en-US" dirty="0" smtClean="0"/>
-              <a:t>Problem:</a:t>
-            </a:r>
-          </a:p>
-          <a:p>
-            <a:pPr lvl="1"/>
-            <a:r>
-              <a:rPr lang="en-US" dirty="0" smtClean="0"/>
-              <a:t>If we compiler another program in the same directory </a:t>
-            </a:r>
-            <a:r>
-              <a:rPr lang="en-US" dirty="0" err="1" smtClean="0"/>
-              <a:t>a.out</a:t>
-            </a:r>
-            <a:r>
-              <a:rPr lang="en-US" dirty="0" smtClean="0"/>
-              <a:t> will be overwritten. </a:t>
-            </a:r>
-          </a:p>
-          <a:p>
-            <a:r>
-              <a:rPr lang="en-US" dirty="0" smtClean="0"/>
-              <a:t>Solution (s):</a:t>
-            </a:r>
-          </a:p>
-          <a:p>
-            <a:pPr lvl="1"/>
-            <a:r>
-              <a:rPr lang="en-US" dirty="0" smtClean="0"/>
-              <a:t>Use move </a:t>
-            </a:r>
-          </a:p>
-          <a:p>
-            <a:pPr lvl="2"/>
-            <a:r>
-              <a:rPr lang="en-US" b="1" dirty="0" err="1" smtClean="0">
-                <a:latin typeface="Courier" charset="0"/>
-                <a:ea typeface="Courier" charset="0"/>
-                <a:cs typeface="Courier" charset="0"/>
-              </a:rPr>
-              <a:t>Mv</a:t>
-            </a:r>
-            <a:r>
-              <a:rPr lang="en-US" b="1" dirty="0" smtClean="0">
-                <a:latin typeface="Courier" charset="0"/>
-                <a:ea typeface="Courier" charset="0"/>
-                <a:cs typeface="Courier" charset="0"/>
-              </a:rPr>
-              <a:t> </a:t>
-            </a:r>
-            <a:r>
-              <a:rPr lang="en-US" b="1" dirty="0" err="1" smtClean="0">
-                <a:latin typeface="Courier" charset="0"/>
-                <a:ea typeface="Courier" charset="0"/>
-                <a:cs typeface="Courier" charset="0"/>
-              </a:rPr>
-              <a:t>a.out</a:t>
-            </a:r>
-            <a:r>
-              <a:rPr lang="en-US" b="1" dirty="0" smtClean="0">
-                <a:latin typeface="Courier" charset="0"/>
-                <a:ea typeface="Courier" charset="0"/>
-                <a:cs typeface="Courier" charset="0"/>
-              </a:rPr>
-              <a:t> </a:t>
-            </a:r>
-            <a:r>
-              <a:rPr lang="en-US" b="1" dirty="0" err="1" smtClean="0">
-                <a:latin typeface="Courier" charset="0"/>
-                <a:ea typeface="Courier" charset="0"/>
-                <a:cs typeface="Courier" charset="0"/>
-              </a:rPr>
-              <a:t>strlen</a:t>
-            </a:r>
-            <a:endParaRPr lang="en-US" b="1" dirty="0" smtClean="0">
-              <a:latin typeface="Courier" charset="0"/>
-              <a:ea typeface="Courier" charset="0"/>
-              <a:cs typeface="Courier" charset="0"/>
-            </a:endParaRPr>
-          </a:p>
-          <a:p>
-            <a:pPr lvl="1"/>
-            <a:r>
-              <a:rPr lang="en-US" dirty="0" smtClean="0"/>
-              <a:t>Use a compiler switch (argument)</a:t>
-            </a:r>
-          </a:p>
-          <a:p>
-            <a:pPr lvl="2"/>
-            <a:r>
-              <a:rPr lang="en-US" b="1" dirty="0" smtClean="0">
-                <a:latin typeface="Courier" charset="0"/>
-                <a:ea typeface="Courier" charset="0"/>
-                <a:cs typeface="Courier" charset="0"/>
-              </a:rPr>
-              <a:t>cc –o </a:t>
-            </a:r>
-            <a:r>
-              <a:rPr lang="en-US" b="1" dirty="0" err="1" smtClean="0">
-                <a:latin typeface="Courier" charset="0"/>
-                <a:ea typeface="Courier" charset="0"/>
-                <a:cs typeface="Courier" charset="0"/>
-              </a:rPr>
-              <a:t>strlen</a:t>
-            </a:r>
-            <a:r>
-              <a:rPr lang="en-US" b="1" dirty="0" smtClean="0">
-                <a:latin typeface="Courier" charset="0"/>
-                <a:ea typeface="Courier" charset="0"/>
-                <a:cs typeface="Courier" charset="0"/>
-              </a:rPr>
-              <a:t> </a:t>
-            </a:r>
-            <a:r>
-              <a:rPr lang="en-US" b="1" dirty="0" err="1" smtClean="0">
-                <a:latin typeface="Courier" charset="0"/>
-                <a:ea typeface="Courier" charset="0"/>
-                <a:cs typeface="Courier" charset="0"/>
-              </a:rPr>
-              <a:t>strlen.c</a:t>
-            </a:r>
-            <a:endParaRPr lang="en-US" b="1" dirty="0">
-              <a:latin typeface="Courier" charset="0"/>
-              <a:ea typeface="Courier" charset="0"/>
-              <a:cs typeface="Courier" charset="0"/>
-            </a:endParaRPr>
-          </a:p>
-        </p:txBody>
-      </p:sp>
-    </p:spTree>
-    <p:extLst>
-      <p:ext uri="{BB962C8B-B14F-4D97-AF65-F5344CB8AC3E}">
-        <p14:creationId xmlns:p14="http://schemas.microsoft.com/office/powerpoint/2010/main" val="1128728699"/>
-      </p:ext>
-    </p:extLst>
-  </p:cSld>
-  <p:clrMapOvr>
-    <a:masterClrMapping/>
-  </p:clrMapOvr>
-  <p:timing>
-    <p:tnLst>
-      <p:par>
-        <p:cTn id="1" dur="indefinite" restart="never" nodeType="tmRoot"/>
-      </p:par>
-    </p:tnLst>
-  </p:timing>
-</p:sld>
-</file>
-
 <file path=ppt/slides/slide2.xml><?xml version="1.0" encoding="utf-8"?>
 <p:sld xmlns:a="http://schemas.openxmlformats.org/drawingml/2006/main" xmlns:r="http://schemas.openxmlformats.org/officeDocument/2006/relationships" xmlns:p="http://schemas.openxmlformats.org/presentationml/2006/main">
   <p:cSld>
@@ -4885,1180 +4171,6 @@
     <p:extLst>
       <p:ext uri="{BB962C8B-B14F-4D97-AF65-F5344CB8AC3E}">
         <p14:creationId xmlns:p14="http://schemas.microsoft.com/office/powerpoint/2010/main" val="3817323233"/>
-      </p:ext>
-    </p:extLst>
-  </p:cSld>
-  <p:clrMapOvr>
-    <a:masterClrMapping/>
-  </p:clrMapOvr>
-  <p:timing>
-    <p:tnLst>
-      <p:par>
-        <p:cTn id="1" dur="indefinite" restart="never" nodeType="tmRoot"/>
-      </p:par>
-    </p:tnLst>
-  </p:timing>
-</p:sld>
-</file>
-
-<file path=ppt/slides/slide20.xml><?xml version="1.0" encoding="utf-8"?>
-<p:sld xmlns:a="http://schemas.openxmlformats.org/drawingml/2006/main" xmlns:r="http://schemas.openxmlformats.org/officeDocument/2006/relationships" xmlns:p="http://schemas.openxmlformats.org/presentationml/2006/main">
-  <p:cSld>
-    <p:spTree>
-      <p:nvGrpSpPr>
-        <p:cNvPr id="1" name=""/>
-        <p:cNvGrpSpPr/>
-        <p:nvPr/>
-      </p:nvGrpSpPr>
-      <p:grpSpPr>
-        <a:xfrm>
-          <a:off x="0" y="0"/>
-          <a:ext cx="0" cy="0"/>
-          <a:chOff x="0" y="0"/>
-          <a:chExt cx="0" cy="0"/>
-        </a:xfrm>
-      </p:grpSpPr>
-      <p:sp>
-        <p:nvSpPr>
-          <p:cNvPr id="2" name="Title 1"/>
-          <p:cNvSpPr>
-            <a:spLocks noGrp="1"/>
-          </p:cNvSpPr>
-          <p:nvPr>
-            <p:ph type="title"/>
-          </p:nvPr>
-        </p:nvSpPr>
-        <p:spPr/>
-        <p:txBody>
-          <a:bodyPr/>
-          <a:lstStyle/>
-          <a:p>
-            <a:r>
-              <a:rPr lang="en-US" dirty="0" smtClean="0"/>
-              <a:t>Declaring loop </a:t>
-            </a:r>
-            <a:r>
-              <a:rPr lang="en-US" dirty="0" err="1" smtClean="0"/>
-              <a:t>vars</a:t>
-            </a:r>
-            <a:r>
-              <a:rPr lang="en-US" dirty="0" smtClean="0"/>
-              <a:t> </a:t>
-            </a:r>
-            <a:endParaRPr lang="en-US" dirty="0"/>
-          </a:p>
-        </p:txBody>
-      </p:sp>
-      <p:sp>
-        <p:nvSpPr>
-          <p:cNvPr id="3" name="Content Placeholder 2"/>
-          <p:cNvSpPr>
-            <a:spLocks noGrp="1"/>
-          </p:cNvSpPr>
-          <p:nvPr>
-            <p:ph idx="1"/>
-          </p:nvPr>
-        </p:nvSpPr>
-        <p:spPr/>
-        <p:txBody>
-          <a:bodyPr/>
-          <a:lstStyle/>
-          <a:p>
-            <a:r>
-              <a:rPr lang="en-US" dirty="0" smtClean="0"/>
-              <a:t>Remember:</a:t>
-            </a:r>
-          </a:p>
-          <a:p>
-            <a:pPr lvl="1"/>
-            <a:r>
-              <a:rPr lang="en-US" b="1" dirty="0" smtClean="0">
-                <a:latin typeface="Courier" charset="0"/>
-                <a:ea typeface="Courier" charset="0"/>
-                <a:cs typeface="Courier" charset="0"/>
-              </a:rPr>
-              <a:t>cc </a:t>
-            </a:r>
-            <a:r>
-              <a:rPr lang="en-US" b="1" dirty="0">
-                <a:latin typeface="Courier" charset="0"/>
-                <a:ea typeface="Courier" charset="0"/>
-                <a:cs typeface="Courier" charset="0"/>
-              </a:rPr>
-              <a:t>–</a:t>
-            </a:r>
-            <a:r>
-              <a:rPr lang="en-US" b="1" dirty="0" err="1">
-                <a:latin typeface="Courier" charset="0"/>
-                <a:ea typeface="Courier" charset="0"/>
-                <a:cs typeface="Courier" charset="0"/>
-              </a:rPr>
-              <a:t>std</a:t>
-            </a:r>
-            <a:r>
-              <a:rPr lang="en-US" b="1" dirty="0">
-                <a:latin typeface="Courier" charset="0"/>
-                <a:ea typeface="Courier" charset="0"/>
-                <a:cs typeface="Courier" charset="0"/>
-              </a:rPr>
-              <a:t>=c99 </a:t>
-            </a:r>
-            <a:r>
-              <a:rPr lang="en-US" b="1" dirty="0" err="1">
-                <a:latin typeface="Courier" charset="0"/>
-                <a:ea typeface="Courier" charset="0"/>
-                <a:cs typeface="Courier" charset="0"/>
-              </a:rPr>
-              <a:t>program.c</a:t>
-            </a:r>
-            <a:r>
-              <a:rPr lang="en-US" b="1" dirty="0">
-                <a:latin typeface="Courier" charset="0"/>
-                <a:ea typeface="Courier" charset="0"/>
-                <a:cs typeface="Courier" charset="0"/>
-              </a:rPr>
-              <a:t> </a:t>
-            </a:r>
-          </a:p>
-          <a:p>
-            <a:r>
-              <a:rPr lang="en-US" dirty="0" smtClean="0"/>
-              <a:t>We could even do:</a:t>
-            </a:r>
-          </a:p>
-          <a:p>
-            <a:pPr lvl="1"/>
-            <a:r>
-              <a:rPr lang="en-US" b="1" dirty="0" smtClean="0">
-                <a:latin typeface="Courier" charset="0"/>
-                <a:ea typeface="Courier" charset="0"/>
-                <a:cs typeface="Courier" charset="0"/>
-              </a:rPr>
-              <a:t>cc –</a:t>
-            </a:r>
-            <a:r>
-              <a:rPr lang="en-US" b="1" dirty="0" err="1" smtClean="0">
-                <a:latin typeface="Courier" charset="0"/>
-                <a:ea typeface="Courier" charset="0"/>
-                <a:cs typeface="Courier" charset="0"/>
-              </a:rPr>
-              <a:t>std</a:t>
-            </a:r>
-            <a:r>
-              <a:rPr lang="en-US" b="1" dirty="0" smtClean="0">
-                <a:latin typeface="Courier" charset="0"/>
-                <a:ea typeface="Courier" charset="0"/>
-                <a:cs typeface="Courier" charset="0"/>
-              </a:rPr>
-              <a:t>=c99 –o program </a:t>
-            </a:r>
-            <a:r>
-              <a:rPr lang="en-US" b="1" dirty="0" err="1" smtClean="0">
-                <a:latin typeface="Courier" charset="0"/>
-                <a:ea typeface="Courier" charset="0"/>
-                <a:cs typeface="Courier" charset="0"/>
-              </a:rPr>
-              <a:t>program.c</a:t>
-            </a:r>
-            <a:endParaRPr lang="en-US" b="1" dirty="0">
-              <a:latin typeface="Courier" charset="0"/>
-              <a:ea typeface="Courier" charset="0"/>
-              <a:cs typeface="Courier" charset="0"/>
-            </a:endParaRPr>
-          </a:p>
-        </p:txBody>
-      </p:sp>
-    </p:spTree>
-    <p:extLst>
-      <p:ext uri="{BB962C8B-B14F-4D97-AF65-F5344CB8AC3E}">
-        <p14:creationId xmlns:p14="http://schemas.microsoft.com/office/powerpoint/2010/main" val="1210433717"/>
-      </p:ext>
-    </p:extLst>
-  </p:cSld>
-  <p:clrMapOvr>
-    <a:masterClrMapping/>
-  </p:clrMapOvr>
-  <p:timing>
-    <p:tnLst>
-      <p:par>
-        <p:cTn id="1" dur="indefinite" restart="never" nodeType="tmRoot"/>
-      </p:par>
-    </p:tnLst>
-  </p:timing>
-</p:sld>
-</file>
-
-<file path=ppt/slides/slide21.xml><?xml version="1.0" encoding="utf-8"?>
-<p:sld xmlns:a="http://schemas.openxmlformats.org/drawingml/2006/main" xmlns:r="http://schemas.openxmlformats.org/officeDocument/2006/relationships" xmlns:p="http://schemas.openxmlformats.org/presentationml/2006/main">
-  <p:cSld>
-    <p:spTree>
-      <p:nvGrpSpPr>
-        <p:cNvPr id="1" name=""/>
-        <p:cNvGrpSpPr/>
-        <p:nvPr/>
-      </p:nvGrpSpPr>
-      <p:grpSpPr>
-        <a:xfrm>
-          <a:off x="0" y="0"/>
-          <a:ext cx="0" cy="0"/>
-          <a:chOff x="0" y="0"/>
-          <a:chExt cx="0" cy="0"/>
-        </a:xfrm>
-      </p:grpSpPr>
-      <p:sp>
-        <p:nvSpPr>
-          <p:cNvPr id="2" name="Title 1"/>
-          <p:cNvSpPr>
-            <a:spLocks noGrp="1"/>
-          </p:cNvSpPr>
-          <p:nvPr>
-            <p:ph type="title"/>
-          </p:nvPr>
-        </p:nvSpPr>
-        <p:spPr/>
-        <p:txBody>
-          <a:bodyPr/>
-          <a:lstStyle/>
-          <a:p>
-            <a:r>
-              <a:rPr lang="en-US" dirty="0" smtClean="0"/>
-              <a:t>Interrupting a program</a:t>
-            </a:r>
-            <a:endParaRPr lang="en-US" dirty="0"/>
-          </a:p>
-        </p:txBody>
-      </p:sp>
-      <p:sp>
-        <p:nvSpPr>
-          <p:cNvPr id="3" name="Content Placeholder 2"/>
-          <p:cNvSpPr>
-            <a:spLocks noGrp="1"/>
-          </p:cNvSpPr>
-          <p:nvPr>
-            <p:ph idx="1"/>
-          </p:nvPr>
-        </p:nvSpPr>
-        <p:spPr/>
-        <p:txBody>
-          <a:bodyPr/>
-          <a:lstStyle/>
-          <a:p>
-            <a:r>
-              <a:rPr lang="en-US" dirty="0" smtClean="0"/>
-              <a:t>Remember about the infinite loop ?</a:t>
-            </a:r>
-          </a:p>
-          <a:p>
-            <a:pPr marL="0" indent="0">
-              <a:buNone/>
-            </a:pPr>
-            <a:r>
-              <a:rPr lang="en-US" dirty="0" smtClean="0"/>
-              <a:t> </a:t>
-            </a:r>
-          </a:p>
-          <a:p>
-            <a:pPr marL="0" indent="0">
-              <a:buNone/>
-            </a:pPr>
-            <a:r>
-              <a:rPr lang="en-US" dirty="0" smtClean="0">
-                <a:latin typeface="Courier" charset="0"/>
-                <a:ea typeface="Courier" charset="0"/>
-                <a:cs typeface="Courier" charset="0"/>
-              </a:rPr>
-              <a:t>	while (</a:t>
-            </a:r>
-            <a:r>
-              <a:rPr lang="en-US" dirty="0" err="1" smtClean="0">
-                <a:latin typeface="Courier" charset="0"/>
-                <a:ea typeface="Courier" charset="0"/>
-                <a:cs typeface="Courier" charset="0"/>
-              </a:rPr>
-              <a:t>i</a:t>
-            </a:r>
-            <a:r>
-              <a:rPr lang="en-US" dirty="0" smtClean="0">
-                <a:latin typeface="Courier" charset="0"/>
-                <a:ea typeface="Courier" charset="0"/>
-                <a:cs typeface="Courier" charset="0"/>
-              </a:rPr>
-              <a:t> &lt; 10) {</a:t>
-            </a:r>
-          </a:p>
-          <a:p>
-            <a:pPr marL="0" indent="0">
-              <a:buNone/>
-            </a:pPr>
-            <a:r>
-              <a:rPr lang="en-US" dirty="0">
-                <a:latin typeface="Courier" charset="0"/>
-                <a:ea typeface="Courier" charset="0"/>
-                <a:cs typeface="Courier" charset="0"/>
-              </a:rPr>
-              <a:t>	</a:t>
-            </a:r>
-            <a:r>
-              <a:rPr lang="en-US" dirty="0" smtClean="0">
-                <a:latin typeface="Courier" charset="0"/>
-                <a:ea typeface="Courier" charset="0"/>
-                <a:cs typeface="Courier" charset="0"/>
-              </a:rPr>
-              <a:t>	</a:t>
-            </a:r>
-            <a:r>
-              <a:rPr lang="en-US" dirty="0" err="1" smtClean="0">
-                <a:latin typeface="Courier" charset="0"/>
-                <a:ea typeface="Courier" charset="0"/>
-                <a:cs typeface="Courier" charset="0"/>
-              </a:rPr>
-              <a:t>printf</a:t>
-            </a:r>
-            <a:r>
-              <a:rPr lang="en-US" dirty="0" smtClean="0">
-                <a:latin typeface="Courier" charset="0"/>
-                <a:ea typeface="Courier" charset="0"/>
-                <a:cs typeface="Courier" charset="0"/>
-              </a:rPr>
-              <a:t>(“hello”);	</a:t>
-            </a:r>
-          </a:p>
-          <a:p>
-            <a:pPr marL="0" indent="0">
-              <a:buNone/>
-            </a:pPr>
-            <a:r>
-              <a:rPr lang="en-US" dirty="0">
-                <a:latin typeface="Courier" charset="0"/>
-                <a:ea typeface="Courier" charset="0"/>
-                <a:cs typeface="Courier" charset="0"/>
-              </a:rPr>
-              <a:t> </a:t>
-            </a:r>
-            <a:r>
-              <a:rPr lang="en-US" dirty="0" smtClean="0">
-                <a:latin typeface="Courier" charset="0"/>
-                <a:ea typeface="Courier" charset="0"/>
-                <a:cs typeface="Courier" charset="0"/>
-              </a:rPr>
-              <a:t>    }</a:t>
-            </a:r>
-          </a:p>
-          <a:p>
-            <a:pPr marL="0" indent="0">
-              <a:buNone/>
-            </a:pPr>
-            <a:endParaRPr lang="en-US" dirty="0" smtClean="0"/>
-          </a:p>
-          <a:p>
-            <a:r>
-              <a:rPr lang="en-US" dirty="0" smtClean="0"/>
-              <a:t>Stop it with </a:t>
-            </a:r>
-            <a:r>
-              <a:rPr lang="en-US" b="1" dirty="0" smtClean="0"/>
-              <a:t>Control - C</a:t>
-            </a:r>
-            <a:r>
-              <a:rPr lang="en-US" b="1" dirty="0"/>
-              <a:t>	</a:t>
-            </a:r>
-          </a:p>
-        </p:txBody>
-      </p:sp>
-    </p:spTree>
-    <p:extLst>
-      <p:ext uri="{BB962C8B-B14F-4D97-AF65-F5344CB8AC3E}">
-        <p14:creationId xmlns:p14="http://schemas.microsoft.com/office/powerpoint/2010/main" val="1699674674"/>
-      </p:ext>
-    </p:extLst>
-  </p:cSld>
-  <p:clrMapOvr>
-    <a:masterClrMapping/>
-  </p:clrMapOvr>
-  <p:timing>
-    <p:tnLst>
-      <p:par>
-        <p:cTn id="1" dur="indefinite" restart="never" nodeType="tmRoot">
-          <p:childTnLst>
-            <p:seq concurrent="1" nextAc="seek">
-              <p:cTn id="2" dur="indefinite" nodeType="mainSeq">
-                <p:childTnLst>
-                  <p:par>
-                    <p:cTn id="3" fill="hold">
-                      <p:stCondLst>
-                        <p:cond delay="indefinite"/>
-                      </p:stCondLst>
-                      <p:childTnLst>
-                        <p:par>
-                          <p:cTn id="4" fill="hold">
-                            <p:stCondLst>
-                              <p:cond delay="0"/>
-                            </p:stCondLst>
-                            <p:childTnLst>
-                              <p:par>
-                                <p:cTn id="5" presetID="2" presetClass="entr" presetSubtype="4" fill="hold" nodeType="clickEffect">
-                                  <p:stCondLst>
-                                    <p:cond delay="0"/>
-                                  </p:stCondLst>
-                                  <p:childTnLst>
-                                    <p:set>
-                                      <p:cBhvr>
-                                        <p:cTn id="6" dur="1" fill="hold">
-                                          <p:stCondLst>
-                                            <p:cond delay="0"/>
-                                          </p:stCondLst>
-                                        </p:cTn>
-                                        <p:tgtEl>
-                                          <p:spTgt spid="3">
-                                            <p:txEl>
-                                              <p:pRg st="2" end="2"/>
-                                            </p:txEl>
-                                          </p:spTgt>
-                                        </p:tgtEl>
-                                        <p:attrNameLst>
-                                          <p:attrName>style.visibility</p:attrName>
-                                        </p:attrNameLst>
-                                      </p:cBhvr>
-                                      <p:to>
-                                        <p:strVal val="visible"/>
-                                      </p:to>
-                                    </p:set>
-                                    <p:anim calcmode="lin" valueType="num">
-                                      <p:cBhvr additive="base">
-                                        <p:cTn id="7" dur="500" fill="hold"/>
-                                        <p:tgtEl>
-                                          <p:spTgt spid="3">
-                                            <p:txEl>
-                                              <p:pRg st="2" end="2"/>
-                                            </p:txEl>
-                                          </p:spTgt>
-                                        </p:tgtEl>
-                                        <p:attrNameLst>
-                                          <p:attrName>ppt_x</p:attrName>
-                                        </p:attrNameLst>
-                                      </p:cBhvr>
-                                      <p:tavLst>
-                                        <p:tav tm="0">
-                                          <p:val>
-                                            <p:strVal val="#ppt_x"/>
-                                          </p:val>
-                                        </p:tav>
-                                        <p:tav tm="100000">
-                                          <p:val>
-                                            <p:strVal val="#ppt_x"/>
-                                          </p:val>
-                                        </p:tav>
-                                      </p:tavLst>
-                                    </p:anim>
-                                    <p:anim calcmode="lin" valueType="num">
-                                      <p:cBhvr additive="base">
-                                        <p:cTn id="8" dur="500" fill="hold"/>
-                                        <p:tgtEl>
-                                          <p:spTgt spid="3">
-                                            <p:txEl>
-                                              <p:pRg st="2" end="2"/>
-                                            </p:txEl>
-                                          </p:spTgt>
-                                        </p:tgtEl>
-                                        <p:attrNameLst>
-                                          <p:attrName>ppt_y</p:attrName>
-                                        </p:attrNameLst>
-                                      </p:cBhvr>
-                                      <p:tavLst>
-                                        <p:tav tm="0">
-                                          <p:val>
-                                            <p:strVal val="1+#ppt_h/2"/>
-                                          </p:val>
-                                        </p:tav>
-                                        <p:tav tm="100000">
-                                          <p:val>
-                                            <p:strVal val="#ppt_y"/>
-                                          </p:val>
-                                        </p:tav>
-                                      </p:tavLst>
-                                    </p:anim>
-                                  </p:childTnLst>
-                                </p:cTn>
-                              </p:par>
-                              <p:par>
-                                <p:cTn id="9" presetID="2" presetClass="entr" presetSubtype="4" fill="hold" nodeType="withEffect">
-                                  <p:stCondLst>
-                                    <p:cond delay="0"/>
-                                  </p:stCondLst>
-                                  <p:childTnLst>
-                                    <p:set>
-                                      <p:cBhvr>
-                                        <p:cTn id="10" dur="1" fill="hold">
-                                          <p:stCondLst>
-                                            <p:cond delay="0"/>
-                                          </p:stCondLst>
-                                        </p:cTn>
-                                        <p:tgtEl>
-                                          <p:spTgt spid="3">
-                                            <p:txEl>
-                                              <p:pRg st="3" end="3"/>
-                                            </p:txEl>
-                                          </p:spTgt>
-                                        </p:tgtEl>
-                                        <p:attrNameLst>
-                                          <p:attrName>style.visibility</p:attrName>
-                                        </p:attrNameLst>
-                                      </p:cBhvr>
-                                      <p:to>
-                                        <p:strVal val="visible"/>
-                                      </p:to>
-                                    </p:set>
-                                    <p:anim calcmode="lin" valueType="num">
-                                      <p:cBhvr additive="base">
-                                        <p:cTn id="11" dur="500" fill="hold"/>
-                                        <p:tgtEl>
-                                          <p:spTgt spid="3">
-                                            <p:txEl>
-                                              <p:pRg st="3" end="3"/>
-                                            </p:txEl>
-                                          </p:spTgt>
-                                        </p:tgtEl>
-                                        <p:attrNameLst>
-                                          <p:attrName>ppt_x</p:attrName>
-                                        </p:attrNameLst>
-                                      </p:cBhvr>
-                                      <p:tavLst>
-                                        <p:tav tm="0">
-                                          <p:val>
-                                            <p:strVal val="#ppt_x"/>
-                                          </p:val>
-                                        </p:tav>
-                                        <p:tav tm="100000">
-                                          <p:val>
-                                            <p:strVal val="#ppt_x"/>
-                                          </p:val>
-                                        </p:tav>
-                                      </p:tavLst>
-                                    </p:anim>
-                                    <p:anim calcmode="lin" valueType="num">
-                                      <p:cBhvr additive="base">
-                                        <p:cTn id="12" dur="500" fill="hold"/>
-                                        <p:tgtEl>
-                                          <p:spTgt spid="3">
-                                            <p:txEl>
-                                              <p:pRg st="3" end="3"/>
-                                            </p:txEl>
-                                          </p:spTgt>
-                                        </p:tgtEl>
-                                        <p:attrNameLst>
-                                          <p:attrName>ppt_y</p:attrName>
-                                        </p:attrNameLst>
-                                      </p:cBhvr>
-                                      <p:tavLst>
-                                        <p:tav tm="0">
-                                          <p:val>
-                                            <p:strVal val="1+#ppt_h/2"/>
-                                          </p:val>
-                                        </p:tav>
-                                        <p:tav tm="100000">
-                                          <p:val>
-                                            <p:strVal val="#ppt_y"/>
-                                          </p:val>
-                                        </p:tav>
-                                      </p:tavLst>
-                                    </p:anim>
-                                  </p:childTnLst>
-                                </p:cTn>
-                              </p:par>
-                              <p:par>
-                                <p:cTn id="13" presetID="2" presetClass="entr" presetSubtype="4" fill="hold" nodeType="withEffect">
-                                  <p:stCondLst>
-                                    <p:cond delay="0"/>
-                                  </p:stCondLst>
-                                  <p:childTnLst>
-                                    <p:set>
-                                      <p:cBhvr>
-                                        <p:cTn id="14" dur="1" fill="hold">
-                                          <p:stCondLst>
-                                            <p:cond delay="0"/>
-                                          </p:stCondLst>
-                                        </p:cTn>
-                                        <p:tgtEl>
-                                          <p:spTgt spid="3">
-                                            <p:txEl>
-                                              <p:pRg st="4" end="4"/>
-                                            </p:txEl>
-                                          </p:spTgt>
-                                        </p:tgtEl>
-                                        <p:attrNameLst>
-                                          <p:attrName>style.visibility</p:attrName>
-                                        </p:attrNameLst>
-                                      </p:cBhvr>
-                                      <p:to>
-                                        <p:strVal val="visible"/>
-                                      </p:to>
-                                    </p:set>
-                                    <p:anim calcmode="lin" valueType="num">
-                                      <p:cBhvr additive="base">
-                                        <p:cTn id="15" dur="500" fill="hold"/>
-                                        <p:tgtEl>
-                                          <p:spTgt spid="3">
-                                            <p:txEl>
-                                              <p:pRg st="4" end="4"/>
-                                            </p:txEl>
-                                          </p:spTgt>
-                                        </p:tgtEl>
-                                        <p:attrNameLst>
-                                          <p:attrName>ppt_x</p:attrName>
-                                        </p:attrNameLst>
-                                      </p:cBhvr>
-                                      <p:tavLst>
-                                        <p:tav tm="0">
-                                          <p:val>
-                                            <p:strVal val="#ppt_x"/>
-                                          </p:val>
-                                        </p:tav>
-                                        <p:tav tm="100000">
-                                          <p:val>
-                                            <p:strVal val="#ppt_x"/>
-                                          </p:val>
-                                        </p:tav>
-                                      </p:tavLst>
-                                    </p:anim>
-                                    <p:anim calcmode="lin" valueType="num">
-                                      <p:cBhvr additive="base">
-                                        <p:cTn id="16" dur="500" fill="hold"/>
-                                        <p:tgtEl>
-                                          <p:spTgt spid="3">
-                                            <p:txEl>
-                                              <p:pRg st="4" end="4"/>
-                                            </p:txEl>
-                                          </p:spTgt>
-                                        </p:tgtEl>
-                                        <p:attrNameLst>
-                                          <p:attrName>ppt_y</p:attrName>
-                                        </p:attrNameLst>
-                                      </p:cBhvr>
-                                      <p:tavLst>
-                                        <p:tav tm="0">
-                                          <p:val>
-                                            <p:strVal val="1+#ppt_h/2"/>
-                                          </p:val>
-                                        </p:tav>
-                                        <p:tav tm="100000">
-                                          <p:val>
-                                            <p:strVal val="#ppt_y"/>
-                                          </p:val>
-                                        </p:tav>
-                                      </p:tavLst>
-                                    </p:anim>
-                                  </p:childTnLst>
-                                </p:cTn>
-                              </p:par>
-                            </p:childTnLst>
-                          </p:cTn>
-                        </p:par>
-                      </p:childTnLst>
-                    </p:cTn>
-                  </p:par>
-                  <p:par>
-                    <p:cTn id="17" fill="hold">
-                      <p:stCondLst>
-                        <p:cond delay="indefinite"/>
-                      </p:stCondLst>
-                      <p:childTnLst>
-                        <p:par>
-                          <p:cTn id="18" fill="hold">
-                            <p:stCondLst>
-                              <p:cond delay="0"/>
-                            </p:stCondLst>
-                            <p:childTnLst>
-                              <p:par>
-                                <p:cTn id="19" presetID="2" presetClass="entr" presetSubtype="4" fill="hold" nodeType="clickEffect">
-                                  <p:stCondLst>
-                                    <p:cond delay="0"/>
-                                  </p:stCondLst>
-                                  <p:childTnLst>
-                                    <p:set>
-                                      <p:cBhvr>
-                                        <p:cTn id="20" dur="1" fill="hold">
-                                          <p:stCondLst>
-                                            <p:cond delay="0"/>
-                                          </p:stCondLst>
-                                        </p:cTn>
-                                        <p:tgtEl>
-                                          <p:spTgt spid="3">
-                                            <p:txEl>
-                                              <p:pRg st="6" end="6"/>
-                                            </p:txEl>
-                                          </p:spTgt>
-                                        </p:tgtEl>
-                                        <p:attrNameLst>
-                                          <p:attrName>style.visibility</p:attrName>
-                                        </p:attrNameLst>
-                                      </p:cBhvr>
-                                      <p:to>
-                                        <p:strVal val="visible"/>
-                                      </p:to>
-                                    </p:set>
-                                    <p:anim calcmode="lin" valueType="num">
-                                      <p:cBhvr additive="base">
-                                        <p:cTn id="21" dur="500" fill="hold"/>
-                                        <p:tgtEl>
-                                          <p:spTgt spid="3">
-                                            <p:txEl>
-                                              <p:pRg st="6" end="6"/>
-                                            </p:txEl>
-                                          </p:spTgt>
-                                        </p:tgtEl>
-                                        <p:attrNameLst>
-                                          <p:attrName>ppt_x</p:attrName>
-                                        </p:attrNameLst>
-                                      </p:cBhvr>
-                                      <p:tavLst>
-                                        <p:tav tm="0">
-                                          <p:val>
-                                            <p:strVal val="#ppt_x"/>
-                                          </p:val>
-                                        </p:tav>
-                                        <p:tav tm="100000">
-                                          <p:val>
-                                            <p:strVal val="#ppt_x"/>
-                                          </p:val>
-                                        </p:tav>
-                                      </p:tavLst>
-                                    </p:anim>
-                                    <p:anim calcmode="lin" valueType="num">
-                                      <p:cBhvr additive="base">
-                                        <p:cTn id="22" dur="500" fill="hold"/>
-                                        <p:tgtEl>
-                                          <p:spTgt spid="3">
-                                            <p:txEl>
-                                              <p:pRg st="6" end="6"/>
-                                            </p:txEl>
-                                          </p:spTgt>
-                                        </p:tgtEl>
-                                        <p:attrNameLst>
-                                          <p:attrName>ppt_y</p:attrName>
-                                        </p:attrNameLst>
-                                      </p:cBhvr>
-                                      <p:tavLst>
-                                        <p:tav tm="0">
-                                          <p:val>
-                                            <p:strVal val="1+#ppt_h/2"/>
-                                          </p:val>
-                                        </p:tav>
-                                        <p:tav tm="100000">
-                                          <p:val>
-                                            <p:strVal val="#ppt_y"/>
-                                          </p:val>
-                                        </p:tav>
-                                      </p:tavLst>
-                                    </p:anim>
-                                  </p:childTnLst>
-                                </p:cTn>
-                              </p:par>
-                            </p:childTnLst>
-                          </p:cTn>
-                        </p:par>
-                      </p:childTnLst>
-                    </p:cTn>
-                  </p:par>
-                </p:childTnLst>
-              </p:cTn>
-              <p:prevCondLst>
-                <p:cond evt="onPrev" delay="0">
-                  <p:tgtEl>
-                    <p:sldTgt/>
-                  </p:tgtEl>
-                </p:cond>
-              </p:prevCondLst>
-              <p:nextCondLst>
-                <p:cond evt="onNext" delay="0">
-                  <p:tgtEl>
-                    <p:sldTgt/>
-                  </p:tgtEl>
-                </p:cond>
-              </p:nextCondLst>
-            </p:seq>
-          </p:childTnLst>
-        </p:cTn>
-      </p:par>
-    </p:tnLst>
-  </p:timing>
-</p:sld>
-</file>
-
-<file path=ppt/slides/slide22.xml><?xml version="1.0" encoding="utf-8"?>
-<p:sld xmlns:a="http://schemas.openxmlformats.org/drawingml/2006/main" xmlns:r="http://schemas.openxmlformats.org/officeDocument/2006/relationships" xmlns:p="http://schemas.openxmlformats.org/presentationml/2006/main">
-  <p:cSld>
-    <p:spTree>
-      <p:nvGrpSpPr>
-        <p:cNvPr id="1" name=""/>
-        <p:cNvGrpSpPr/>
-        <p:nvPr/>
-      </p:nvGrpSpPr>
-      <p:grpSpPr>
-        <a:xfrm>
-          <a:off x="0" y="0"/>
-          <a:ext cx="0" cy="0"/>
-          <a:chOff x="0" y="0"/>
-          <a:chExt cx="0" cy="0"/>
-        </a:xfrm>
-      </p:grpSpPr>
-      <p:sp>
-        <p:nvSpPr>
-          <p:cNvPr id="2" name="Title 1"/>
-          <p:cNvSpPr>
-            <a:spLocks noGrp="1"/>
-          </p:cNvSpPr>
-          <p:nvPr>
-            <p:ph type="title"/>
-          </p:nvPr>
-        </p:nvSpPr>
-        <p:spPr/>
-        <p:txBody>
-          <a:bodyPr/>
-          <a:lstStyle/>
-          <a:p>
-            <a:r>
-              <a:rPr lang="en-US" dirty="0" smtClean="0"/>
-              <a:t>Redirection</a:t>
-            </a:r>
-            <a:endParaRPr lang="en-US" dirty="0"/>
-          </a:p>
-        </p:txBody>
-      </p:sp>
-      <p:sp>
-        <p:nvSpPr>
-          <p:cNvPr id="3" name="Content Placeholder 2"/>
-          <p:cNvSpPr>
-            <a:spLocks noGrp="1"/>
-          </p:cNvSpPr>
-          <p:nvPr>
-            <p:ph idx="1"/>
-          </p:nvPr>
-        </p:nvSpPr>
-        <p:spPr/>
-        <p:txBody>
-          <a:bodyPr/>
-          <a:lstStyle/>
-          <a:p>
-            <a:r>
-              <a:rPr lang="en-US" dirty="0" smtClean="0"/>
-              <a:t>Accomplished using the &gt; </a:t>
-            </a:r>
-          </a:p>
-          <a:p>
-            <a:pPr lvl="1"/>
-            <a:r>
-              <a:rPr lang="en-US" dirty="0" err="1" smtClean="0"/>
-              <a:t>ls</a:t>
-            </a:r>
-            <a:r>
-              <a:rPr lang="en-US" dirty="0" smtClean="0"/>
-              <a:t> &gt; </a:t>
-            </a:r>
-            <a:r>
-              <a:rPr lang="en-US" dirty="0" err="1" smtClean="0"/>
-              <a:t>tmp</a:t>
-            </a:r>
-            <a:endParaRPr lang="en-US" dirty="0" smtClean="0"/>
-          </a:p>
-          <a:p>
-            <a:pPr lvl="1"/>
-            <a:endParaRPr lang="en-US" dirty="0"/>
-          </a:p>
-          <a:p>
-            <a:r>
-              <a:rPr lang="en-US" dirty="0" smtClean="0"/>
-              <a:t>We can do it for a program too !</a:t>
-            </a:r>
-          </a:p>
-          <a:p>
-            <a:pPr lvl="1"/>
-            <a:endParaRPr lang="en-US" dirty="0"/>
-          </a:p>
-        </p:txBody>
-      </p:sp>
-    </p:spTree>
-    <p:extLst>
-      <p:ext uri="{BB962C8B-B14F-4D97-AF65-F5344CB8AC3E}">
-        <p14:creationId xmlns:p14="http://schemas.microsoft.com/office/powerpoint/2010/main" val="1723383072"/>
-      </p:ext>
-    </p:extLst>
-  </p:cSld>
-  <p:clrMapOvr>
-    <a:masterClrMapping/>
-  </p:clrMapOvr>
-  <p:timing>
-    <p:tnLst>
-      <p:par>
-        <p:cTn id="1" dur="indefinite" restart="never" nodeType="tmRoot"/>
-      </p:par>
-    </p:tnLst>
-  </p:timing>
-</p:sld>
-</file>
-
-<file path=ppt/slides/slide23.xml><?xml version="1.0" encoding="utf-8"?>
-<p:sld xmlns:a="http://schemas.openxmlformats.org/drawingml/2006/main" xmlns:r="http://schemas.openxmlformats.org/officeDocument/2006/relationships" xmlns:p="http://schemas.openxmlformats.org/presentationml/2006/main">
-  <p:cSld>
-    <p:spTree>
-      <p:nvGrpSpPr>
-        <p:cNvPr id="1" name=""/>
-        <p:cNvGrpSpPr/>
-        <p:nvPr/>
-      </p:nvGrpSpPr>
-      <p:grpSpPr>
-        <a:xfrm>
-          <a:off x="0" y="0"/>
-          <a:ext cx="0" cy="0"/>
-          <a:chOff x="0" y="0"/>
-          <a:chExt cx="0" cy="0"/>
-        </a:xfrm>
-      </p:grpSpPr>
-      <p:sp>
-        <p:nvSpPr>
-          <p:cNvPr id="2" name="Title 1"/>
-          <p:cNvSpPr>
-            <a:spLocks noGrp="1"/>
-          </p:cNvSpPr>
-          <p:nvPr>
-            <p:ph type="title"/>
-          </p:nvPr>
-        </p:nvSpPr>
-        <p:spPr/>
-        <p:txBody>
-          <a:bodyPr/>
-          <a:lstStyle/>
-          <a:p>
-            <a:r>
-              <a:rPr lang="en-US" dirty="0" smtClean="0"/>
-              <a:t>Homework for Friday </a:t>
-            </a:r>
-            <a:endParaRPr lang="en-US" dirty="0"/>
-          </a:p>
-        </p:txBody>
-      </p:sp>
-      <p:sp>
-        <p:nvSpPr>
-          <p:cNvPr id="3" name="Content Placeholder 2"/>
-          <p:cNvSpPr>
-            <a:spLocks noGrp="1"/>
-          </p:cNvSpPr>
-          <p:nvPr>
-            <p:ph idx="1"/>
-          </p:nvPr>
-        </p:nvSpPr>
-        <p:spPr/>
-        <p:txBody>
-          <a:bodyPr>
-            <a:normAutofit fontScale="92500" lnSpcReduction="20000"/>
-          </a:bodyPr>
-          <a:lstStyle/>
-          <a:p>
-            <a:r>
-              <a:rPr lang="en-US" dirty="0" smtClean="0"/>
-              <a:t>Go through this tutorial:</a:t>
-            </a:r>
-          </a:p>
-          <a:p>
-            <a:pPr lvl="1"/>
-            <a:r>
-              <a:rPr lang="en-US" dirty="0">
-                <a:hlinkClick r:id="rId2"/>
-              </a:rPr>
-              <a:t>https://learn.wheelhouse.io/events/nyu</a:t>
-            </a:r>
-            <a:endParaRPr lang="en-US" dirty="0"/>
-          </a:p>
-          <a:p>
-            <a:pPr marL="0" indent="0">
-              <a:buNone/>
-            </a:pPr>
-            <a:endParaRPr lang="en-US" dirty="0" smtClean="0"/>
-          </a:p>
-          <a:p>
-            <a:r>
-              <a:rPr lang="en-US" dirty="0" err="1" smtClean="0"/>
-              <a:t>Git</a:t>
-            </a:r>
-            <a:r>
-              <a:rPr lang="en-US" dirty="0" smtClean="0"/>
-              <a:t> </a:t>
-            </a:r>
-            <a:r>
-              <a:rPr lang="en-US" dirty="0" smtClean="0"/>
-              <a:t>Concepts: </a:t>
-            </a:r>
-          </a:p>
-          <a:p>
-            <a:pPr lvl="1"/>
-            <a:r>
-              <a:rPr lang="en-US" dirty="0" smtClean="0"/>
-              <a:t>Fork</a:t>
-            </a:r>
-          </a:p>
-          <a:p>
-            <a:pPr lvl="1"/>
-            <a:r>
-              <a:rPr lang="en-US" dirty="0" smtClean="0"/>
-              <a:t>Clone</a:t>
-            </a:r>
-          </a:p>
-          <a:p>
-            <a:pPr lvl="1"/>
-            <a:r>
-              <a:rPr lang="en-US" dirty="0" smtClean="0"/>
-              <a:t>Pull request</a:t>
-            </a:r>
-          </a:p>
-          <a:p>
-            <a:pPr marL="457200" lvl="1" indent="0">
-              <a:buNone/>
-            </a:pPr>
-            <a:endParaRPr lang="en-US" dirty="0" smtClean="0"/>
-          </a:p>
-          <a:p>
-            <a:r>
-              <a:rPr lang="en-US" dirty="0" err="1" smtClean="0"/>
-              <a:t>Git</a:t>
-            </a:r>
-            <a:r>
-              <a:rPr lang="en-US" dirty="0" smtClean="0"/>
-              <a:t> reading:</a:t>
-            </a:r>
-          </a:p>
-          <a:p>
-            <a:pPr lvl="1"/>
-            <a:r>
-              <a:rPr lang="en-US" dirty="0">
-                <a:hlinkClick r:id="rId3"/>
-              </a:rPr>
-              <a:t>https://guides.github.com/activities/forking/</a:t>
-            </a:r>
-            <a:r>
-              <a:rPr lang="en-US" dirty="0" smtClean="0">
-                <a:hlinkClick r:id="rId3"/>
-              </a:rPr>
-              <a:t>index.html</a:t>
-            </a:r>
-            <a:endParaRPr lang="en-US" dirty="0" smtClean="0"/>
-          </a:p>
-          <a:p>
-            <a:pPr lvl="1"/>
-            <a:endParaRPr lang="en-US" dirty="0" smtClean="0"/>
-          </a:p>
-        </p:txBody>
-      </p:sp>
-    </p:spTree>
-    <p:extLst>
-      <p:ext uri="{BB962C8B-B14F-4D97-AF65-F5344CB8AC3E}">
-        <p14:creationId xmlns:p14="http://schemas.microsoft.com/office/powerpoint/2010/main" val="1728550643"/>
-      </p:ext>
-    </p:extLst>
-  </p:cSld>
-  <p:clrMapOvr>
-    <a:masterClrMapping/>
-  </p:clrMapOvr>
-  <p:timing>
-    <p:tnLst>
-      <p:par>
-        <p:cTn id="1" dur="indefinite" restart="never" nodeType="tmRoot"/>
-      </p:par>
-    </p:tnLst>
-  </p:timing>
-</p:sld>
-</file>
-
-<file path=ppt/slides/slide24.xml><?xml version="1.0" encoding="utf-8"?>
-<p:sld xmlns:a="http://schemas.openxmlformats.org/drawingml/2006/main" xmlns:r="http://schemas.openxmlformats.org/officeDocument/2006/relationships" xmlns:p="http://schemas.openxmlformats.org/presentationml/2006/main">
-  <p:cSld>
-    <p:spTree>
-      <p:nvGrpSpPr>
-        <p:cNvPr id="1" name=""/>
-        <p:cNvGrpSpPr/>
-        <p:nvPr/>
-      </p:nvGrpSpPr>
-      <p:grpSpPr>
-        <a:xfrm>
-          <a:off x="0" y="0"/>
-          <a:ext cx="0" cy="0"/>
-          <a:chOff x="0" y="0"/>
-          <a:chExt cx="0" cy="0"/>
-        </a:xfrm>
-      </p:grpSpPr>
-      <p:sp>
-        <p:nvSpPr>
-          <p:cNvPr id="2" name="Title 1"/>
-          <p:cNvSpPr>
-            <a:spLocks noGrp="1"/>
-          </p:cNvSpPr>
-          <p:nvPr>
-            <p:ph type="title"/>
-          </p:nvPr>
-        </p:nvSpPr>
-        <p:spPr/>
-        <p:txBody>
-          <a:bodyPr/>
-          <a:lstStyle/>
-          <a:p>
-            <a:r>
-              <a:rPr lang="en-US" dirty="0" smtClean="0"/>
-              <a:t>Practice</a:t>
-            </a:r>
-            <a:endParaRPr lang="en-US" dirty="0"/>
-          </a:p>
-        </p:txBody>
-      </p:sp>
-      <p:sp>
-        <p:nvSpPr>
-          <p:cNvPr id="3" name="Content Placeholder 2"/>
-          <p:cNvSpPr>
-            <a:spLocks noGrp="1"/>
-          </p:cNvSpPr>
-          <p:nvPr>
-            <p:ph idx="1"/>
-          </p:nvPr>
-        </p:nvSpPr>
-        <p:spPr/>
-        <p:txBody>
-          <a:bodyPr/>
-          <a:lstStyle/>
-          <a:p>
-            <a:r>
-              <a:rPr lang="en-US" dirty="0" smtClean="0"/>
-              <a:t>Complete the following program by writing </a:t>
-            </a:r>
-            <a:r>
-              <a:rPr lang="en-US" dirty="0" err="1" smtClean="0"/>
-              <a:t>stringlength</a:t>
-            </a:r>
-            <a:r>
-              <a:rPr lang="en-US" dirty="0" smtClean="0"/>
-              <a:t>() function that prints the length of a string. Compare your result with the </a:t>
-            </a:r>
-            <a:r>
-              <a:rPr lang="en-US" dirty="0" err="1" smtClean="0"/>
-              <a:t>strlen</a:t>
-            </a:r>
-            <a:r>
-              <a:rPr lang="en-US" dirty="0" smtClean="0"/>
-              <a:t>() function in </a:t>
-            </a:r>
-            <a:r>
-              <a:rPr lang="en-US" dirty="0" err="1" smtClean="0"/>
-              <a:t>string.h</a:t>
-            </a:r>
-            <a:r>
-              <a:rPr lang="en-US" dirty="0" smtClean="0"/>
-              <a:t>.</a:t>
-            </a:r>
-            <a:endParaRPr lang="en-US" dirty="0"/>
-          </a:p>
-        </p:txBody>
-      </p:sp>
-    </p:spTree>
-    <p:extLst>
-      <p:ext uri="{BB962C8B-B14F-4D97-AF65-F5344CB8AC3E}">
-        <p14:creationId xmlns:p14="http://schemas.microsoft.com/office/powerpoint/2010/main" val="63371597"/>
       </p:ext>
     </p:extLst>
   </p:cSld>
@@ -6261,11 +4373,6 @@
               </a:rPr>
               <a:t>	Statement;</a:t>
             </a:r>
-            <a:endParaRPr lang="en-US" b="1" dirty="0" smtClean="0">
-              <a:latin typeface="Courier" charset="0"/>
-              <a:ea typeface="Courier" charset="0"/>
-              <a:cs typeface="Courier" charset="0"/>
-            </a:endParaRPr>
           </a:p>
           <a:p>
             <a:pPr marL="0" indent="0">
@@ -6485,15 +4592,7 @@
                 <a:ea typeface="Courier" charset="0"/>
                 <a:cs typeface="Courier" charset="0"/>
               </a:rPr>
-              <a:t> = </a:t>
-            </a:r>
-            <a:r>
-              <a:rPr lang="en-US" sz="2400" b="1" dirty="0">
-                <a:latin typeface="Courier" charset="0"/>
-                <a:ea typeface="Courier" charset="0"/>
-                <a:cs typeface="Courier" charset="0"/>
-              </a:rPr>
-              <a:t>0</a:t>
+              <a:t> = 0</a:t>
             </a:r>
             <a:r>
               <a:rPr lang="en-US" sz="2400" b="1" dirty="0" smtClean="0">
@@ -7833,11 +5932,7 @@
           <a:p>
             <a:r>
               <a:rPr lang="en-US" dirty="0" smtClean="0"/>
-              <a:t>There will be at least one: our old friend main</a:t>
-            </a:r>
-            <a:r>
-              <a:rPr lang="en-US" dirty="0" smtClean="0"/>
-              <a:t>()</a:t>
+              <a:t>There will be at least one: our old friend main()</a:t>
             </a:r>
           </a:p>
         </p:txBody>
@@ -8145,14 +6240,7 @@
                 <a:latin typeface="Consolas"/>
                 <a:cs typeface="Consolas"/>
               </a:rPr>
-              <a:t> </a:t>
-            </a:r>
-            <a:r>
-              <a:rPr lang="en-US" dirty="0" smtClean="0">
-                <a:latin typeface="Consolas"/>
-                <a:cs typeface="Consolas"/>
-              </a:rPr>
-              <a:t>main()</a:t>
+              <a:t> main()</a:t>
             </a:r>
           </a:p>
           <a:p>

</xml_diff>